<commit_message>
fix: start adding session 5 nest.js
</commit_message>
<xml_diff>
--- a/nestjs/nestjs-04.pptx
+++ b/nestjs/nestjs-04.pptx
@@ -5,7 +5,7 @@
     <p:sldMasterId id="2147483705" r:id="rId1"/>
   </p:sldMasterIdLst>
   <p:notesMasterIdLst>
-    <p:notesMasterId r:id="rId18"/>
+    <p:notesMasterId r:id="rId13"/>
   </p:notesMasterIdLst>
   <p:sldIdLst>
     <p:sldId id="259" r:id="rId2"/>
@@ -18,12 +18,7 @@
     <p:sldId id="323" r:id="rId9"/>
     <p:sldId id="331" r:id="rId10"/>
     <p:sldId id="324" r:id="rId11"/>
-    <p:sldId id="325" r:id="rId12"/>
-    <p:sldId id="332" r:id="rId13"/>
-    <p:sldId id="326" r:id="rId14"/>
-    <p:sldId id="333" r:id="rId15"/>
-    <p:sldId id="327" r:id="rId16"/>
-    <p:sldId id="320" r:id="rId17"/>
+    <p:sldId id="320" r:id="rId12"/>
   </p:sldIdLst>
   <p:sldSz cx="12192000" cy="6858000"/>
   <p:notesSz cx="6858000" cy="9144000"/>
@@ -212,7 +207,7 @@
           <a:p>
             <a:fld id="{9B9ECB28-6A22-4037-9487-F3F739F744D6}" type="datetimeFigureOut">
               <a:rPr lang="en-US" smtClean="0"/>
-              <a:t>1/25/2022</a:t>
+              <a:t>1/26/2022</a:t>
             </a:fld>
             <a:endParaRPr lang="en-US"/>
           </a:p>
@@ -1637,7 +1632,7 @@
           <a:p>
             <a:fld id="{0FE84E6F-3671-472C-BE6F-A37BC298F4AB}" type="slidenum">
               <a:rPr lang="en-US" smtClean="0"/>
-              <a:t>16</a:t>
+              <a:t>11</a:t>
             </a:fld>
             <a:endParaRPr lang="en-US"/>
           </a:p>
@@ -1840,7 +1835,7 @@
           <a:p>
             <a:fld id="{19B6F524-99F3-4BEA-ACD7-976EF4D36657}" type="datetime1">
               <a:rPr lang="en-US" smtClean="0"/>
-              <a:t>1/25/2022</a:t>
+              <a:t>1/26/2022</a:t>
             </a:fld>
             <a:endParaRPr lang="en-US" dirty="0"/>
           </a:p>
@@ -2149,7 +2144,7 @@
           <a:p>
             <a:fld id="{2145C3A9-05D9-428D-9788-A7F14838F6F9}" type="datetime1">
               <a:rPr lang="en-US" smtClean="0"/>
-              <a:t>1/25/2022</a:t>
+              <a:t>1/26/2022</a:t>
             </a:fld>
             <a:endParaRPr lang="en-US" dirty="0"/>
           </a:p>
@@ -2347,7 +2342,7 @@
           <a:p>
             <a:fld id="{82C701FB-B03E-4981-A9F8-99B474DD173A}" type="datetime1">
               <a:rPr lang="en-US" smtClean="0"/>
-              <a:t>1/25/2022</a:t>
+              <a:t>1/26/2022</a:t>
             </a:fld>
             <a:endParaRPr lang="en-US" dirty="0"/>
           </a:p>
@@ -2614,7 +2609,7 @@
           <a:p>
             <a:fld id="{7A7E8EF3-CBF7-4EB9-B6E5-3754574E3433}" type="datetime1">
               <a:rPr lang="en-US" smtClean="0"/>
-              <a:t>1/25/2022</a:t>
+              <a:t>1/26/2022</a:t>
             </a:fld>
             <a:endParaRPr lang="en-US" dirty="0"/>
           </a:p>
@@ -3054,7 +3049,7 @@
           <a:p>
             <a:fld id="{DA8A4A96-31AC-487C-9F15-1822D58542B7}" type="datetime1">
               <a:rPr lang="en-US" smtClean="0"/>
-              <a:t>1/25/2022</a:t>
+              <a:t>1/26/2022</a:t>
             </a:fld>
             <a:endParaRPr lang="en-US" dirty="0"/>
           </a:p>
@@ -3595,7 +3590,7 @@
           <a:p>
             <a:fld id="{FBBF9546-09C4-4F24-A284-5B81FF8659B4}" type="datetime1">
               <a:rPr lang="en-US" smtClean="0"/>
-              <a:t>1/25/2022</a:t>
+              <a:t>1/26/2022</a:t>
             </a:fld>
             <a:endParaRPr lang="en-US" dirty="0"/>
           </a:p>
@@ -4481,7 +4476,7 @@
           <a:p>
             <a:fld id="{5BF4405D-15A5-450B-B053-484859B9C8F7}" type="datetime1">
               <a:rPr lang="en-US" smtClean="0"/>
-              <a:t>1/25/2022</a:t>
+              <a:t>1/26/2022</a:t>
             </a:fld>
             <a:endParaRPr lang="en-US" dirty="0"/>
           </a:p>
@@ -4655,7 +4650,7 @@
           <a:p>
             <a:fld id="{E0366559-EC21-40C1-8A65-9A3B4EA78391}" type="datetime1">
               <a:rPr lang="en-US" smtClean="0"/>
-              <a:t>1/25/2022</a:t>
+              <a:t>1/26/2022</a:t>
             </a:fld>
             <a:endParaRPr lang="en-US" dirty="0"/>
           </a:p>
@@ -4843,7 +4838,7 @@
           <a:p>
             <a:fld id="{4F09CA92-695C-4FFA-8E37-4D2C288BCC04}" type="datetime1">
               <a:rPr lang="en-US" smtClean="0"/>
-              <a:t>1/25/2022</a:t>
+              <a:t>1/26/2022</a:t>
             </a:fld>
             <a:endParaRPr lang="en-US" dirty="0"/>
           </a:p>
@@ -5017,7 +5012,7 @@
           <a:p>
             <a:fld id="{CA551262-FC07-4FE4-9221-F72F7D4F209A}" type="datetime1">
               <a:rPr lang="en-US" smtClean="0"/>
-              <a:t>1/25/2022</a:t>
+              <a:t>1/26/2022</a:t>
             </a:fld>
             <a:endParaRPr lang="en-US" dirty="0"/>
           </a:p>
@@ -5265,7 +5260,7 @@
           <a:p>
             <a:fld id="{46A321E4-8899-4F7D-BEB1-BD52626ABD8D}" type="datetime1">
               <a:rPr lang="en-US" smtClean="0"/>
-              <a:t>1/25/2022</a:t>
+              <a:t>1/26/2022</a:t>
             </a:fld>
             <a:endParaRPr lang="en-US" dirty="0"/>
           </a:p>
@@ -5511,7 +5506,7 @@
           <a:p>
             <a:fld id="{B53F6DFA-8A0E-4513-867D-18B9AA66B23C}" type="datetime1">
               <a:rPr lang="en-US" smtClean="0"/>
-              <a:t>1/25/2022</a:t>
+              <a:t>1/26/2022</a:t>
             </a:fld>
             <a:endParaRPr lang="en-US" dirty="0"/>
           </a:p>
@@ -5998,7 +5993,7 @@
           <a:p>
             <a:fld id="{154283A7-B9AC-454B-A468-44B75A398B49}" type="datetime1">
               <a:rPr lang="en-US" smtClean="0"/>
-              <a:t>1/25/2022</a:t>
+              <a:t>1/26/2022</a:t>
             </a:fld>
             <a:endParaRPr lang="en-US" dirty="0"/>
           </a:p>
@@ -6120,7 +6115,7 @@
           <a:p>
             <a:fld id="{A3F8184D-DEDD-48A0-9ACA-5F6ED9EFE5B8}" type="datetime1">
               <a:rPr lang="en-US" smtClean="0"/>
-              <a:t>1/25/2022</a:t>
+              <a:t>1/26/2022</a:t>
             </a:fld>
             <a:endParaRPr lang="en-US" dirty="0"/>
           </a:p>
@@ -6219,7 +6214,7 @@
           <a:p>
             <a:fld id="{BF38AC0E-F520-48F3-BA14-8BAB82D735FB}" type="datetime1">
               <a:rPr lang="en-US" smtClean="0"/>
-              <a:t>1/25/2022</a:t>
+              <a:t>1/26/2022</a:t>
             </a:fld>
             <a:endParaRPr lang="en-US" dirty="0"/>
           </a:p>
@@ -6478,7 +6473,7 @@
           <a:p>
             <a:fld id="{317D0F2A-2724-4AD4-BF4C-A7B1910D9412}" type="datetime1">
               <a:rPr lang="en-US" smtClean="0"/>
-              <a:t>1/25/2022</a:t>
+              <a:t>1/26/2022</a:t>
             </a:fld>
             <a:endParaRPr lang="en-US" dirty="0"/>
           </a:p>
@@ -6789,7 +6784,7 @@
           <a:p>
             <a:fld id="{9A0B82A5-4A21-4F82-91DB-989CE997E82E}" type="datetime1">
               <a:rPr lang="en-US" smtClean="0"/>
-              <a:t>1/25/2022</a:t>
+              <a:t>1/26/2022</a:t>
             </a:fld>
             <a:endParaRPr lang="en-US" dirty="0"/>
           </a:p>
@@ -7026,7 +7021,7 @@
           <a:p>
             <a:fld id="{01BFEF8A-AE08-4951-B923-589F814B0C31}" type="datetime1">
               <a:rPr lang="en-US" smtClean="0"/>
-              <a:t>1/25/2022</a:t>
+              <a:t>1/26/2022</a:t>
             </a:fld>
             <a:endParaRPr lang="en-US" dirty="0"/>
           </a:p>
@@ -8056,1084 +8051,6 @@
           <p:cNvPr id="2" name="Title 1">
             <a:extLst>
               <a:ext uri="{FF2B5EF4-FFF2-40B4-BE49-F238E27FC236}">
-                <a16:creationId xmlns:a16="http://schemas.microsoft.com/office/drawing/2014/main" id="{2ED9F42B-DD57-44A9-A024-B5A21971513F}"/>
-              </a:ext>
-            </a:extLst>
-          </p:cNvPr>
-          <p:cNvSpPr>
-            <a:spLocks noGrp="1"/>
-          </p:cNvSpPr>
-          <p:nvPr>
-            <p:ph type="title"/>
-          </p:nvPr>
-        </p:nvSpPr>
-        <p:spPr/>
-        <p:txBody>
-          <a:bodyPr/>
-          <a:lstStyle/>
-          <a:p>
-            <a:r>
-              <a:rPr lang="en-US" dirty="0"/>
-              <a:t>Demo</a:t>
-            </a:r>
-            <a:endParaRPr lang="fa-IR" dirty="0"/>
-          </a:p>
-        </p:txBody>
-      </p:sp>
-      <p:sp>
-        <p:nvSpPr>
-          <p:cNvPr id="3" name="Content Placeholder 2">
-            <a:extLst>
-              <a:ext uri="{FF2B5EF4-FFF2-40B4-BE49-F238E27FC236}">
-                <a16:creationId xmlns:a16="http://schemas.microsoft.com/office/drawing/2014/main" id="{276175C7-A8EE-437B-8B8B-9E55BB637E06}"/>
-              </a:ext>
-            </a:extLst>
-          </p:cNvPr>
-          <p:cNvSpPr>
-            <a:spLocks noGrp="1"/>
-          </p:cNvSpPr>
-          <p:nvPr>
-            <p:ph idx="1"/>
-          </p:nvPr>
-        </p:nvSpPr>
-        <p:spPr/>
-        <p:txBody>
-          <a:bodyPr/>
-          <a:lstStyle/>
-          <a:p>
-            <a:r>
-              <a:rPr lang="en-US" dirty="0"/>
-              <a:t>Dynamic module</a:t>
-            </a:r>
-          </a:p>
-          <a:p>
-            <a:pPr lvl="1"/>
-            <a:r>
-              <a:rPr lang="en-US" dirty="0"/>
-              <a:t>Static modules can’t have their providers be configured by a module that consuming it.</a:t>
-            </a:r>
-          </a:p>
-          <a:p>
-            <a:pPr lvl="1"/>
-            <a:r>
-              <a:rPr lang="en-US" dirty="0"/>
-              <a:t>Why does that matter?</a:t>
-            </a:r>
-          </a:p>
-          <a:p>
-            <a:pPr lvl="2"/>
-            <a:r>
-              <a:rPr lang="en-US" dirty="0"/>
-              <a:t>For general purpose modules </a:t>
-            </a:r>
-            <a:r>
-              <a:rPr lang="en-US" dirty="0">
-                <a:sym typeface="Wingdings" panose="05000000000000000000" pitchFamily="2" charset="2"/>
-              </a:rPr>
-              <a:t>, that needs to behave differently in different circumstances</a:t>
-            </a:r>
-          </a:p>
-          <a:p>
-            <a:pPr lvl="1"/>
-            <a:r>
-              <a:rPr lang="en-US" dirty="0">
-                <a:sym typeface="Wingdings" panose="05000000000000000000" pitchFamily="2" charset="2"/>
-              </a:rPr>
-              <a:t>Use static method with some names like: register, </a:t>
-            </a:r>
-            <a:r>
-              <a:rPr lang="en-US" dirty="0" err="1">
-                <a:sym typeface="Wingdings" panose="05000000000000000000" pitchFamily="2" charset="2"/>
-              </a:rPr>
-              <a:t>forRoot</a:t>
-            </a:r>
-            <a:r>
-              <a:rPr lang="en-US" dirty="0">
-                <a:sym typeface="Wingdings" panose="05000000000000000000" pitchFamily="2" charset="2"/>
-              </a:rPr>
-              <a:t>, …</a:t>
-            </a:r>
-          </a:p>
-          <a:p>
-            <a:pPr lvl="1"/>
-            <a:r>
-              <a:rPr lang="en-US" dirty="0">
-                <a:sym typeface="Wingdings" panose="05000000000000000000" pitchFamily="2" charset="2"/>
-              </a:rPr>
-              <a:t>Return a </a:t>
-            </a:r>
-            <a:r>
-              <a:rPr lang="en-US" dirty="0" err="1">
-                <a:sym typeface="Wingdings" panose="05000000000000000000" pitchFamily="2" charset="2"/>
-              </a:rPr>
-              <a:t>DynamicModule</a:t>
-            </a:r>
-            <a:r>
-              <a:rPr lang="en-US" dirty="0">
-                <a:sym typeface="Wingdings" panose="05000000000000000000" pitchFamily="2" charset="2"/>
-              </a:rPr>
-              <a:t> object inside that function</a:t>
-            </a:r>
-          </a:p>
-          <a:p>
-            <a:pPr lvl="2"/>
-            <a:r>
-              <a:rPr lang="en-US" dirty="0">
-                <a:sym typeface="Wingdings" panose="05000000000000000000" pitchFamily="2" charset="2"/>
-              </a:rPr>
-              <a:t>Module: just like your module name</a:t>
-            </a:r>
-          </a:p>
-          <a:p>
-            <a:pPr lvl="2"/>
-            <a:r>
-              <a:rPr lang="en-US" dirty="0">
-                <a:sym typeface="Wingdings" panose="05000000000000000000" pitchFamily="2" charset="2"/>
-              </a:rPr>
-              <a:t>Providers: needed providers that you add them inside your static function</a:t>
-            </a:r>
-            <a:endParaRPr lang="fa-IR" dirty="0"/>
-          </a:p>
-        </p:txBody>
-      </p:sp>
-      <p:sp>
-        <p:nvSpPr>
-          <p:cNvPr id="4" name="Footer Placeholder 3">
-            <a:extLst>
-              <a:ext uri="{FF2B5EF4-FFF2-40B4-BE49-F238E27FC236}">
-                <a16:creationId xmlns:a16="http://schemas.microsoft.com/office/drawing/2014/main" id="{3613FF50-268B-484B-82F0-AB16C67F789B}"/>
-              </a:ext>
-            </a:extLst>
-          </p:cNvPr>
-          <p:cNvSpPr>
-            <a:spLocks noGrp="1"/>
-          </p:cNvSpPr>
-          <p:nvPr>
-            <p:ph type="ftr" sz="quarter" idx="11"/>
-          </p:nvPr>
-        </p:nvSpPr>
-        <p:spPr/>
-        <p:txBody>
-          <a:bodyPr/>
-          <a:lstStyle/>
-          <a:p>
-            <a:r>
-              <a:rPr lang="en-US"/>
-              <a:t>Nodejs Basics</a:t>
-            </a:r>
-            <a:endParaRPr lang="en-US" dirty="0"/>
-          </a:p>
-        </p:txBody>
-      </p:sp>
-      <p:sp>
-        <p:nvSpPr>
-          <p:cNvPr id="5" name="Slide Number Placeholder 4">
-            <a:extLst>
-              <a:ext uri="{FF2B5EF4-FFF2-40B4-BE49-F238E27FC236}">
-                <a16:creationId xmlns:a16="http://schemas.microsoft.com/office/drawing/2014/main" id="{61B3882C-482F-4779-A76B-93D3C15064E3}"/>
-              </a:ext>
-            </a:extLst>
-          </p:cNvPr>
-          <p:cNvSpPr>
-            <a:spLocks noGrp="1"/>
-          </p:cNvSpPr>
-          <p:nvPr>
-            <p:ph type="sldNum" sz="quarter" idx="12"/>
-          </p:nvPr>
-        </p:nvSpPr>
-        <p:spPr/>
-        <p:txBody>
-          <a:bodyPr/>
-          <a:lstStyle/>
-          <a:p>
-            <a:fld id="{3A98EE3D-8CD1-4C3F-BD1C-C98C9596463C}" type="slidenum">
-              <a:rPr lang="en-US" smtClean="0"/>
-              <a:t>11</a:t>
-            </a:fld>
-            <a:endParaRPr lang="en-US" dirty="0"/>
-          </a:p>
-        </p:txBody>
-      </p:sp>
-    </p:spTree>
-    <p:extLst>
-      <p:ext uri="{BB962C8B-B14F-4D97-AF65-F5344CB8AC3E}">
-        <p14:creationId xmlns:p14="http://schemas.microsoft.com/office/powerpoint/2010/main" val="2295156601"/>
-      </p:ext>
-    </p:extLst>
-  </p:cSld>
-  <p:clrMapOvr>
-    <a:masterClrMapping/>
-  </p:clrMapOvr>
-</p:sld>
-</file>
-
-<file path=ppt/slides/slide12.xml><?xml version="1.0" encoding="utf-8"?>
-<p:sld xmlns:a="http://schemas.openxmlformats.org/drawingml/2006/main" xmlns:r="http://schemas.openxmlformats.org/officeDocument/2006/relationships" xmlns:p="http://schemas.openxmlformats.org/presentationml/2006/main">
-  <p:cSld>
-    <p:spTree>
-      <p:nvGrpSpPr>
-        <p:cNvPr id="1" name=""/>
-        <p:cNvGrpSpPr/>
-        <p:nvPr/>
-      </p:nvGrpSpPr>
-      <p:grpSpPr>
-        <a:xfrm>
-          <a:off x="0" y="0"/>
-          <a:ext cx="0" cy="0"/>
-          <a:chOff x="0" y="0"/>
-          <a:chExt cx="0" cy="0"/>
-        </a:xfrm>
-      </p:grpSpPr>
-      <p:sp>
-        <p:nvSpPr>
-          <p:cNvPr id="2" name="Title 1">
-            <a:extLst>
-              <a:ext uri="{FF2B5EF4-FFF2-40B4-BE49-F238E27FC236}">
-                <a16:creationId xmlns:a16="http://schemas.microsoft.com/office/drawing/2014/main" id="{615C4ACC-0187-4B99-A448-819B2F9DA6A9}"/>
-              </a:ext>
-            </a:extLst>
-          </p:cNvPr>
-          <p:cNvSpPr>
-            <a:spLocks noGrp="1"/>
-          </p:cNvSpPr>
-          <p:nvPr>
-            <p:ph type="title"/>
-          </p:nvPr>
-        </p:nvSpPr>
-        <p:spPr/>
-        <p:txBody>
-          <a:bodyPr/>
-          <a:lstStyle/>
-          <a:p>
-            <a:r>
-              <a:rPr lang="en-US" dirty="0"/>
-              <a:t>New requirement</a:t>
-            </a:r>
-          </a:p>
-        </p:txBody>
-      </p:sp>
-      <p:sp>
-        <p:nvSpPr>
-          <p:cNvPr id="3" name="Content Placeholder 2">
-            <a:extLst>
-              <a:ext uri="{FF2B5EF4-FFF2-40B4-BE49-F238E27FC236}">
-                <a16:creationId xmlns:a16="http://schemas.microsoft.com/office/drawing/2014/main" id="{30448F5A-5D08-47DD-8F1F-20E029964C25}"/>
-              </a:ext>
-            </a:extLst>
-          </p:cNvPr>
-          <p:cNvSpPr>
-            <a:spLocks noGrp="1"/>
-          </p:cNvSpPr>
-          <p:nvPr>
-            <p:ph idx="1"/>
-          </p:nvPr>
-        </p:nvSpPr>
-        <p:spPr/>
-        <p:txBody>
-          <a:bodyPr/>
-          <a:lstStyle/>
-          <a:p>
-            <a:r>
-              <a:rPr lang="en-US" dirty="0"/>
-              <a:t>Dev requirement: we need a logger service</a:t>
-            </a:r>
-          </a:p>
-        </p:txBody>
-      </p:sp>
-      <p:sp>
-        <p:nvSpPr>
-          <p:cNvPr id="4" name="Footer Placeholder 3">
-            <a:extLst>
-              <a:ext uri="{FF2B5EF4-FFF2-40B4-BE49-F238E27FC236}">
-                <a16:creationId xmlns:a16="http://schemas.microsoft.com/office/drawing/2014/main" id="{213C8B56-3E14-4749-B365-EDFD2EB3620C}"/>
-              </a:ext>
-            </a:extLst>
-          </p:cNvPr>
-          <p:cNvSpPr>
-            <a:spLocks noGrp="1"/>
-          </p:cNvSpPr>
-          <p:nvPr>
-            <p:ph type="ftr" sz="quarter" idx="11"/>
-          </p:nvPr>
-        </p:nvSpPr>
-        <p:spPr/>
-        <p:txBody>
-          <a:bodyPr/>
-          <a:lstStyle/>
-          <a:p>
-            <a:r>
-              <a:rPr lang="en-US"/>
-              <a:t>Nodejs Basics</a:t>
-            </a:r>
-            <a:endParaRPr lang="en-US" dirty="0"/>
-          </a:p>
-        </p:txBody>
-      </p:sp>
-      <p:sp>
-        <p:nvSpPr>
-          <p:cNvPr id="5" name="Slide Number Placeholder 4">
-            <a:extLst>
-              <a:ext uri="{FF2B5EF4-FFF2-40B4-BE49-F238E27FC236}">
-                <a16:creationId xmlns:a16="http://schemas.microsoft.com/office/drawing/2014/main" id="{5F341EA8-194F-466F-8B82-11602EAB855E}"/>
-              </a:ext>
-            </a:extLst>
-          </p:cNvPr>
-          <p:cNvSpPr>
-            <a:spLocks noGrp="1"/>
-          </p:cNvSpPr>
-          <p:nvPr>
-            <p:ph type="sldNum" sz="quarter" idx="12"/>
-          </p:nvPr>
-        </p:nvSpPr>
-        <p:spPr/>
-        <p:txBody>
-          <a:bodyPr/>
-          <a:lstStyle/>
-          <a:p>
-            <a:fld id="{3A98EE3D-8CD1-4C3F-BD1C-C98C9596463C}" type="slidenum">
-              <a:rPr lang="en-US" smtClean="0"/>
-              <a:t>12</a:t>
-            </a:fld>
-            <a:endParaRPr lang="en-US" dirty="0"/>
-          </a:p>
-        </p:txBody>
-      </p:sp>
-    </p:spTree>
-    <p:extLst>
-      <p:ext uri="{BB962C8B-B14F-4D97-AF65-F5344CB8AC3E}">
-        <p14:creationId xmlns:p14="http://schemas.microsoft.com/office/powerpoint/2010/main" val="2059607593"/>
-      </p:ext>
-    </p:extLst>
-  </p:cSld>
-  <p:clrMapOvr>
-    <a:masterClrMapping/>
-  </p:clrMapOvr>
-</p:sld>
-</file>
-
-<file path=ppt/slides/slide13.xml><?xml version="1.0" encoding="utf-8"?>
-<p:sld xmlns:a="http://schemas.openxmlformats.org/drawingml/2006/main" xmlns:r="http://schemas.openxmlformats.org/officeDocument/2006/relationships" xmlns:p="http://schemas.openxmlformats.org/presentationml/2006/main">
-  <p:cSld>
-    <p:spTree>
-      <p:nvGrpSpPr>
-        <p:cNvPr id="1" name=""/>
-        <p:cNvGrpSpPr/>
-        <p:nvPr/>
-      </p:nvGrpSpPr>
-      <p:grpSpPr>
-        <a:xfrm>
-          <a:off x="0" y="0"/>
-          <a:ext cx="0" cy="0"/>
-          <a:chOff x="0" y="0"/>
-          <a:chExt cx="0" cy="0"/>
-        </a:xfrm>
-      </p:grpSpPr>
-      <p:sp>
-        <p:nvSpPr>
-          <p:cNvPr id="2" name="Title 1">
-            <a:extLst>
-              <a:ext uri="{FF2B5EF4-FFF2-40B4-BE49-F238E27FC236}">
-                <a16:creationId xmlns:a16="http://schemas.microsoft.com/office/drawing/2014/main" id="{35255E52-7484-436E-A464-E512926DC1AC}"/>
-              </a:ext>
-            </a:extLst>
-          </p:cNvPr>
-          <p:cNvSpPr>
-            <a:spLocks noGrp="1"/>
-          </p:cNvSpPr>
-          <p:nvPr>
-            <p:ph type="title"/>
-          </p:nvPr>
-        </p:nvSpPr>
-        <p:spPr/>
-        <p:txBody>
-          <a:bodyPr/>
-          <a:lstStyle/>
-          <a:p>
-            <a:r>
-              <a:rPr lang="en-US" dirty="0"/>
-              <a:t>Demo</a:t>
-            </a:r>
-            <a:endParaRPr lang="fa-IR" dirty="0"/>
-          </a:p>
-        </p:txBody>
-      </p:sp>
-      <p:sp>
-        <p:nvSpPr>
-          <p:cNvPr id="3" name="Content Placeholder 2">
-            <a:extLst>
-              <a:ext uri="{FF2B5EF4-FFF2-40B4-BE49-F238E27FC236}">
-                <a16:creationId xmlns:a16="http://schemas.microsoft.com/office/drawing/2014/main" id="{747CA358-9F75-40DA-A315-74B4C8CD43BB}"/>
-              </a:ext>
-            </a:extLst>
-          </p:cNvPr>
-          <p:cNvSpPr>
-            <a:spLocks noGrp="1"/>
-          </p:cNvSpPr>
-          <p:nvPr>
-            <p:ph idx="1"/>
-          </p:nvPr>
-        </p:nvSpPr>
-        <p:spPr/>
-        <p:txBody>
-          <a:bodyPr>
-            <a:normAutofit/>
-          </a:bodyPr>
-          <a:lstStyle/>
-          <a:p>
-            <a:r>
-              <a:rPr lang="en-US" dirty="0"/>
-              <a:t>Other scopes than singleton:</a:t>
-            </a:r>
-          </a:p>
-          <a:p>
-            <a:pPr lvl="1"/>
-            <a:r>
-              <a:rPr lang="en-US" dirty="0"/>
-              <a:t>All singleton providers instantiated when the program bootstrapped</a:t>
-            </a:r>
-          </a:p>
-          <a:p>
-            <a:pPr lvl="1"/>
-            <a:r>
-              <a:rPr lang="en-US" dirty="0"/>
-              <a:t>Transient</a:t>
-            </a:r>
-          </a:p>
-          <a:p>
-            <a:pPr lvl="2"/>
-            <a:r>
-              <a:rPr lang="en-US" dirty="0"/>
-              <a:t>Every time it will instantiated</a:t>
-            </a:r>
-          </a:p>
-          <a:p>
-            <a:pPr lvl="1"/>
-            <a:r>
-              <a:rPr lang="en-US" dirty="0"/>
-              <a:t>There is two place to tell nest our provider scope:</a:t>
-            </a:r>
-          </a:p>
-          <a:p>
-            <a:pPr lvl="2"/>
-            <a:r>
-              <a:rPr lang="en-US" dirty="0"/>
-              <a:t>@Injectable</a:t>
-            </a:r>
-          </a:p>
-          <a:p>
-            <a:pPr lvl="2"/>
-            <a:r>
-              <a:rPr lang="en-US" dirty="0"/>
-              <a:t>Inside providers array in module</a:t>
-            </a:r>
-          </a:p>
-          <a:p>
-            <a:pPr lvl="1"/>
-            <a:r>
-              <a:rPr lang="en-US" dirty="0"/>
-              <a:t>What is the benefit of transient?</a:t>
-            </a:r>
-          </a:p>
-          <a:p>
-            <a:pPr lvl="2"/>
-            <a:r>
-              <a:rPr lang="en-US" dirty="0"/>
-              <a:t>Each class has its own state</a:t>
-            </a:r>
-          </a:p>
-          <a:p>
-            <a:pPr lvl="2"/>
-            <a:r>
-              <a:rPr lang="en-US" dirty="0"/>
-              <a:t>Suppose logger class with different prefixes.</a:t>
-            </a:r>
-          </a:p>
-          <a:p>
-            <a:pPr lvl="1"/>
-            <a:endParaRPr lang="fa-IR" dirty="0"/>
-          </a:p>
-        </p:txBody>
-      </p:sp>
-      <p:sp>
-        <p:nvSpPr>
-          <p:cNvPr id="4" name="Footer Placeholder 3">
-            <a:extLst>
-              <a:ext uri="{FF2B5EF4-FFF2-40B4-BE49-F238E27FC236}">
-                <a16:creationId xmlns:a16="http://schemas.microsoft.com/office/drawing/2014/main" id="{12F84F52-D84C-468D-ADC7-FDFF4098A52D}"/>
-              </a:ext>
-            </a:extLst>
-          </p:cNvPr>
-          <p:cNvSpPr>
-            <a:spLocks noGrp="1"/>
-          </p:cNvSpPr>
-          <p:nvPr>
-            <p:ph type="ftr" sz="quarter" idx="11"/>
-          </p:nvPr>
-        </p:nvSpPr>
-        <p:spPr/>
-        <p:txBody>
-          <a:bodyPr/>
-          <a:lstStyle/>
-          <a:p>
-            <a:r>
-              <a:rPr lang="en-US"/>
-              <a:t>Nodejs Basics</a:t>
-            </a:r>
-            <a:endParaRPr lang="en-US" dirty="0"/>
-          </a:p>
-        </p:txBody>
-      </p:sp>
-      <p:sp>
-        <p:nvSpPr>
-          <p:cNvPr id="5" name="Slide Number Placeholder 4">
-            <a:extLst>
-              <a:ext uri="{FF2B5EF4-FFF2-40B4-BE49-F238E27FC236}">
-                <a16:creationId xmlns:a16="http://schemas.microsoft.com/office/drawing/2014/main" id="{7CB037D8-445B-44F0-A1FA-496A80D17939}"/>
-              </a:ext>
-            </a:extLst>
-          </p:cNvPr>
-          <p:cNvSpPr>
-            <a:spLocks noGrp="1"/>
-          </p:cNvSpPr>
-          <p:nvPr>
-            <p:ph type="sldNum" sz="quarter" idx="12"/>
-          </p:nvPr>
-        </p:nvSpPr>
-        <p:spPr/>
-        <p:txBody>
-          <a:bodyPr/>
-          <a:lstStyle/>
-          <a:p>
-            <a:fld id="{3A98EE3D-8CD1-4C3F-BD1C-C98C9596463C}" type="slidenum">
-              <a:rPr lang="en-US" smtClean="0"/>
-              <a:t>13</a:t>
-            </a:fld>
-            <a:endParaRPr lang="en-US" dirty="0"/>
-          </a:p>
-        </p:txBody>
-      </p:sp>
-      <p:pic>
-        <p:nvPicPr>
-          <p:cNvPr id="9" name="Picture 8">
-            <a:extLst>
-              <a:ext uri="{FF2B5EF4-FFF2-40B4-BE49-F238E27FC236}">
-                <a16:creationId xmlns:a16="http://schemas.microsoft.com/office/drawing/2014/main" id="{A260C43C-7BEF-4916-B417-2B03D1C58229}"/>
-              </a:ext>
-            </a:extLst>
-          </p:cNvPr>
-          <p:cNvPicPr>
-            <a:picLocks noChangeAspect="1"/>
-          </p:cNvPicPr>
-          <p:nvPr/>
-        </p:nvPicPr>
-        <p:blipFill>
-          <a:blip r:embed="rId2"/>
-          <a:stretch>
-            <a:fillRect/>
-          </a:stretch>
-        </p:blipFill>
-        <p:spPr>
-          <a:xfrm>
-            <a:off x="6931823" y="3823758"/>
-            <a:ext cx="4877509" cy="1874494"/>
-          </a:xfrm>
-          <a:prstGeom prst="rect">
-            <a:avLst/>
-          </a:prstGeom>
-        </p:spPr>
-      </p:pic>
-    </p:spTree>
-    <p:extLst>
-      <p:ext uri="{BB962C8B-B14F-4D97-AF65-F5344CB8AC3E}">
-        <p14:creationId xmlns:p14="http://schemas.microsoft.com/office/powerpoint/2010/main" val="3682007813"/>
-      </p:ext>
-    </p:extLst>
-  </p:cSld>
-  <p:clrMapOvr>
-    <a:masterClrMapping/>
-  </p:clrMapOvr>
-</p:sld>
-</file>
-
-<file path=ppt/slides/slide14.xml><?xml version="1.0" encoding="utf-8"?>
-<p:sld xmlns:a="http://schemas.openxmlformats.org/drawingml/2006/main" xmlns:r="http://schemas.openxmlformats.org/officeDocument/2006/relationships" xmlns:p="http://schemas.openxmlformats.org/presentationml/2006/main">
-  <p:cSld>
-    <p:spTree>
-      <p:nvGrpSpPr>
-        <p:cNvPr id="1" name=""/>
-        <p:cNvGrpSpPr/>
-        <p:nvPr/>
-      </p:nvGrpSpPr>
-      <p:grpSpPr>
-        <a:xfrm>
-          <a:off x="0" y="0"/>
-          <a:ext cx="0" cy="0"/>
-          <a:chOff x="0" y="0"/>
-          <a:chExt cx="0" cy="0"/>
-        </a:xfrm>
-      </p:grpSpPr>
-      <p:sp>
-        <p:nvSpPr>
-          <p:cNvPr id="2" name="Title 1">
-            <a:extLst>
-              <a:ext uri="{FF2B5EF4-FFF2-40B4-BE49-F238E27FC236}">
-                <a16:creationId xmlns:a16="http://schemas.microsoft.com/office/drawing/2014/main" id="{1798674D-738C-4E41-9AD5-E13E095EFB07}"/>
-              </a:ext>
-            </a:extLst>
-          </p:cNvPr>
-          <p:cNvSpPr>
-            <a:spLocks noGrp="1"/>
-          </p:cNvSpPr>
-          <p:nvPr>
-            <p:ph type="title"/>
-          </p:nvPr>
-        </p:nvSpPr>
-        <p:spPr/>
-        <p:txBody>
-          <a:bodyPr/>
-          <a:lstStyle/>
-          <a:p>
-            <a:r>
-              <a:rPr lang="en-US" dirty="0"/>
-              <a:t>New requirement</a:t>
-            </a:r>
-          </a:p>
-        </p:txBody>
-      </p:sp>
-      <p:sp>
-        <p:nvSpPr>
-          <p:cNvPr id="3" name="Content Placeholder 2">
-            <a:extLst>
-              <a:ext uri="{FF2B5EF4-FFF2-40B4-BE49-F238E27FC236}">
-                <a16:creationId xmlns:a16="http://schemas.microsoft.com/office/drawing/2014/main" id="{B73C19F3-91B1-41BE-B003-A527EA0DBB06}"/>
-              </a:ext>
-            </a:extLst>
-          </p:cNvPr>
-          <p:cNvSpPr>
-            <a:spLocks noGrp="1"/>
-          </p:cNvSpPr>
-          <p:nvPr>
-            <p:ph idx="1"/>
-          </p:nvPr>
-        </p:nvSpPr>
-        <p:spPr/>
-        <p:txBody>
-          <a:bodyPr/>
-          <a:lstStyle/>
-          <a:p>
-            <a:r>
-              <a:rPr lang="en-US" dirty="0"/>
-              <a:t>We need a new route to show a banner to user, but it must translated Based on the request header (accept-language).</a:t>
-            </a:r>
-          </a:p>
-        </p:txBody>
-      </p:sp>
-      <p:sp>
-        <p:nvSpPr>
-          <p:cNvPr id="4" name="Footer Placeholder 3">
-            <a:extLst>
-              <a:ext uri="{FF2B5EF4-FFF2-40B4-BE49-F238E27FC236}">
-                <a16:creationId xmlns:a16="http://schemas.microsoft.com/office/drawing/2014/main" id="{B6E8FF4C-625D-4EFD-82C1-051C5574110D}"/>
-              </a:ext>
-            </a:extLst>
-          </p:cNvPr>
-          <p:cNvSpPr>
-            <a:spLocks noGrp="1"/>
-          </p:cNvSpPr>
-          <p:nvPr>
-            <p:ph type="ftr" sz="quarter" idx="11"/>
-          </p:nvPr>
-        </p:nvSpPr>
-        <p:spPr/>
-        <p:txBody>
-          <a:bodyPr/>
-          <a:lstStyle/>
-          <a:p>
-            <a:r>
-              <a:rPr lang="en-US"/>
-              <a:t>Nodejs Basics</a:t>
-            </a:r>
-            <a:endParaRPr lang="en-US" dirty="0"/>
-          </a:p>
-        </p:txBody>
-      </p:sp>
-      <p:sp>
-        <p:nvSpPr>
-          <p:cNvPr id="5" name="Slide Number Placeholder 4">
-            <a:extLst>
-              <a:ext uri="{FF2B5EF4-FFF2-40B4-BE49-F238E27FC236}">
-                <a16:creationId xmlns:a16="http://schemas.microsoft.com/office/drawing/2014/main" id="{767DB68A-FDE2-4FDF-80C5-E15F57DBF48F}"/>
-              </a:ext>
-            </a:extLst>
-          </p:cNvPr>
-          <p:cNvSpPr>
-            <a:spLocks noGrp="1"/>
-          </p:cNvSpPr>
-          <p:nvPr>
-            <p:ph type="sldNum" sz="quarter" idx="12"/>
-          </p:nvPr>
-        </p:nvSpPr>
-        <p:spPr/>
-        <p:txBody>
-          <a:bodyPr/>
-          <a:lstStyle/>
-          <a:p>
-            <a:fld id="{3A98EE3D-8CD1-4C3F-BD1C-C98C9596463C}" type="slidenum">
-              <a:rPr lang="en-US" smtClean="0"/>
-              <a:t>14</a:t>
-            </a:fld>
-            <a:endParaRPr lang="en-US" dirty="0"/>
-          </a:p>
-        </p:txBody>
-      </p:sp>
-      <p:pic>
-        <p:nvPicPr>
-          <p:cNvPr id="4100" name="Picture 4">
-            <a:extLst>
-              <a:ext uri="{FF2B5EF4-FFF2-40B4-BE49-F238E27FC236}">
-                <a16:creationId xmlns:a16="http://schemas.microsoft.com/office/drawing/2014/main" id="{92379B6E-5747-49AA-BBC6-C7ACD753CAAB}"/>
-              </a:ext>
-            </a:extLst>
-          </p:cNvPr>
-          <p:cNvPicPr>
-            <a:picLocks noChangeAspect="1" noChangeArrowheads="1"/>
-          </p:cNvPicPr>
-          <p:nvPr/>
-        </p:nvPicPr>
-        <p:blipFill>
-          <a:blip r:embed="rId2">
-            <a:extLst>
-              <a:ext uri="{28A0092B-C50C-407E-A947-70E740481C1C}">
-                <a14:useLocalDpi xmlns:a14="http://schemas.microsoft.com/office/drawing/2010/main" val="0"/>
-              </a:ext>
-            </a:extLst>
-          </a:blip>
-          <a:srcRect/>
-          <a:stretch>
-            <a:fillRect/>
-          </a:stretch>
-        </p:blipFill>
-        <p:spPr bwMode="auto">
-          <a:xfrm>
-            <a:off x="3356484" y="2644965"/>
-            <a:ext cx="5468384" cy="4045106"/>
-          </a:xfrm>
-          <a:prstGeom prst="rect">
-            <a:avLst/>
-          </a:prstGeom>
-          <a:noFill/>
-          <a:extLst>
-            <a:ext uri="{909E8E84-426E-40DD-AFC4-6F175D3DCCD1}">
-              <a14:hiddenFill xmlns:a14="http://schemas.microsoft.com/office/drawing/2010/main">
-                <a:solidFill>
-                  <a:srgbClr val="FFFFFF"/>
-                </a:solidFill>
-              </a14:hiddenFill>
-            </a:ext>
-          </a:extLst>
-        </p:spPr>
-      </p:pic>
-    </p:spTree>
-    <p:extLst>
-      <p:ext uri="{BB962C8B-B14F-4D97-AF65-F5344CB8AC3E}">
-        <p14:creationId xmlns:p14="http://schemas.microsoft.com/office/powerpoint/2010/main" val="3559466427"/>
-      </p:ext>
-    </p:extLst>
-  </p:cSld>
-  <p:clrMapOvr>
-    <a:masterClrMapping/>
-  </p:clrMapOvr>
-</p:sld>
-</file>
-
-<file path=ppt/slides/slide15.xml><?xml version="1.0" encoding="utf-8"?>
-<p:sld xmlns:a="http://schemas.openxmlformats.org/drawingml/2006/main" xmlns:r="http://schemas.openxmlformats.org/officeDocument/2006/relationships" xmlns:p="http://schemas.openxmlformats.org/presentationml/2006/main">
-  <p:cSld>
-    <p:spTree>
-      <p:nvGrpSpPr>
-        <p:cNvPr id="1" name=""/>
-        <p:cNvGrpSpPr/>
-        <p:nvPr/>
-      </p:nvGrpSpPr>
-      <p:grpSpPr>
-        <a:xfrm>
-          <a:off x="0" y="0"/>
-          <a:ext cx="0" cy="0"/>
-          <a:chOff x="0" y="0"/>
-          <a:chExt cx="0" cy="0"/>
-        </a:xfrm>
-      </p:grpSpPr>
-      <p:sp>
-        <p:nvSpPr>
-          <p:cNvPr id="2" name="Title 1">
-            <a:extLst>
-              <a:ext uri="{FF2B5EF4-FFF2-40B4-BE49-F238E27FC236}">
-                <a16:creationId xmlns:a16="http://schemas.microsoft.com/office/drawing/2014/main" id="{B51DDC48-E053-4E5D-A18F-4745F507AC8E}"/>
-              </a:ext>
-            </a:extLst>
-          </p:cNvPr>
-          <p:cNvSpPr>
-            <a:spLocks noGrp="1"/>
-          </p:cNvSpPr>
-          <p:nvPr>
-            <p:ph type="title"/>
-          </p:nvPr>
-        </p:nvSpPr>
-        <p:spPr/>
-        <p:txBody>
-          <a:bodyPr/>
-          <a:lstStyle/>
-          <a:p>
-            <a:r>
-              <a:rPr lang="en-US" dirty="0"/>
-              <a:t>Demo</a:t>
-            </a:r>
-            <a:endParaRPr lang="fa-IR" dirty="0"/>
-          </a:p>
-        </p:txBody>
-      </p:sp>
-      <p:sp>
-        <p:nvSpPr>
-          <p:cNvPr id="3" name="Content Placeholder 2">
-            <a:extLst>
-              <a:ext uri="{FF2B5EF4-FFF2-40B4-BE49-F238E27FC236}">
-                <a16:creationId xmlns:a16="http://schemas.microsoft.com/office/drawing/2014/main" id="{362E8326-EE06-4DC3-AE57-551FE2234C8B}"/>
-              </a:ext>
-            </a:extLst>
-          </p:cNvPr>
-          <p:cNvSpPr>
-            <a:spLocks noGrp="1"/>
-          </p:cNvSpPr>
-          <p:nvPr>
-            <p:ph idx="1"/>
-          </p:nvPr>
-        </p:nvSpPr>
-        <p:spPr/>
-        <p:txBody>
-          <a:bodyPr>
-            <a:normAutofit fontScale="92500" lnSpcReduction="10000"/>
-          </a:bodyPr>
-          <a:lstStyle/>
-          <a:p>
-            <a:r>
-              <a:rPr lang="en-US" dirty="0"/>
-              <a:t>Request scoped providers</a:t>
-            </a:r>
-          </a:p>
-          <a:p>
-            <a:pPr lvl="1"/>
-            <a:r>
-              <a:rPr lang="en-US" dirty="0"/>
-              <a:t>They are instantiated whenever a new request is received</a:t>
-            </a:r>
-          </a:p>
-          <a:p>
-            <a:pPr lvl="1"/>
-            <a:r>
-              <a:rPr lang="en-US" dirty="0"/>
-              <a:t>And They are automatically garbage collected after the request finished</a:t>
-            </a:r>
-          </a:p>
-          <a:p>
-            <a:pPr lvl="1"/>
-            <a:r>
-              <a:rPr lang="en-US" dirty="0"/>
-              <a:t>Don’t forget the bubbling </a:t>
-            </a:r>
-            <a:r>
-              <a:rPr lang="en-US" dirty="0">
-                <a:sym typeface="Wingdings" panose="05000000000000000000" pitchFamily="2" charset="2"/>
-              </a:rPr>
-              <a:t></a:t>
-            </a:r>
-          </a:p>
-          <a:p>
-            <a:pPr lvl="2"/>
-            <a:r>
-              <a:rPr lang="en-US" dirty="0">
-                <a:sym typeface="Wingdings" panose="05000000000000000000" pitchFamily="2" charset="2"/>
-              </a:rPr>
-              <a:t>Your services which uses a request scoped service will become a request scoped service implicitly</a:t>
-            </a:r>
-          </a:p>
-          <a:p>
-            <a:pPr lvl="1"/>
-            <a:r>
-              <a:rPr lang="en-US" dirty="0">
-                <a:sym typeface="Wingdings" panose="05000000000000000000" pitchFamily="2" charset="2"/>
-              </a:rPr>
-              <a:t>Request scoped providers can inject the request object</a:t>
-            </a:r>
-          </a:p>
-          <a:p>
-            <a:pPr lvl="2"/>
-            <a:r>
-              <a:rPr lang="en-US" dirty="0">
-                <a:sym typeface="Wingdings" panose="05000000000000000000" pitchFamily="2" charset="2"/>
-              </a:rPr>
-              <a:t>It is useful if you want access request fields like headers, …</a:t>
-            </a:r>
-          </a:p>
-          <a:p>
-            <a:pPr lvl="2"/>
-            <a:r>
-              <a:rPr lang="en-US" dirty="0">
-                <a:sym typeface="Wingdings" panose="05000000000000000000" pitchFamily="2" charset="2"/>
-              </a:rPr>
-              <a:t>@Inject(REQUEST)</a:t>
-            </a:r>
-          </a:p>
-          <a:p>
-            <a:pPr lvl="2"/>
-            <a:r>
-              <a:rPr lang="en-US" dirty="0">
-                <a:sym typeface="Wingdings" panose="05000000000000000000" pitchFamily="2" charset="2"/>
-              </a:rPr>
-              <a:t>Request scoped providers may impact your program performance</a:t>
-            </a:r>
-          </a:p>
-          <a:p>
-            <a:pPr lvl="3"/>
-            <a:r>
-              <a:rPr lang="en-US" dirty="0">
-                <a:sym typeface="Wingdings" panose="05000000000000000000" pitchFamily="2" charset="2"/>
-              </a:rPr>
-              <a:t>It will slightly decrease your avg response time</a:t>
-            </a:r>
-          </a:p>
-          <a:p>
-            <a:pPr lvl="3"/>
-            <a:r>
-              <a:rPr lang="en-US" dirty="0"/>
-              <a:t>Unless a provider must be request scope, it is always recommended to use the default (singleton) scope</a:t>
-            </a:r>
-            <a:endParaRPr lang="fa-IR" dirty="0"/>
-          </a:p>
-        </p:txBody>
-      </p:sp>
-      <p:sp>
-        <p:nvSpPr>
-          <p:cNvPr id="4" name="Footer Placeholder 3">
-            <a:extLst>
-              <a:ext uri="{FF2B5EF4-FFF2-40B4-BE49-F238E27FC236}">
-                <a16:creationId xmlns:a16="http://schemas.microsoft.com/office/drawing/2014/main" id="{18861364-9BF9-4A17-B7BE-99749458A055}"/>
-              </a:ext>
-            </a:extLst>
-          </p:cNvPr>
-          <p:cNvSpPr>
-            <a:spLocks noGrp="1"/>
-          </p:cNvSpPr>
-          <p:nvPr>
-            <p:ph type="ftr" sz="quarter" idx="11"/>
-          </p:nvPr>
-        </p:nvSpPr>
-        <p:spPr/>
-        <p:txBody>
-          <a:bodyPr/>
-          <a:lstStyle/>
-          <a:p>
-            <a:r>
-              <a:rPr lang="en-US"/>
-              <a:t>Nodejs Basics</a:t>
-            </a:r>
-            <a:endParaRPr lang="en-US" dirty="0"/>
-          </a:p>
-        </p:txBody>
-      </p:sp>
-      <p:sp>
-        <p:nvSpPr>
-          <p:cNvPr id="5" name="Slide Number Placeholder 4">
-            <a:extLst>
-              <a:ext uri="{FF2B5EF4-FFF2-40B4-BE49-F238E27FC236}">
-                <a16:creationId xmlns:a16="http://schemas.microsoft.com/office/drawing/2014/main" id="{62B2E439-F35E-463F-B4AD-145D972217D0}"/>
-              </a:ext>
-            </a:extLst>
-          </p:cNvPr>
-          <p:cNvSpPr>
-            <a:spLocks noGrp="1"/>
-          </p:cNvSpPr>
-          <p:nvPr>
-            <p:ph type="sldNum" sz="quarter" idx="12"/>
-          </p:nvPr>
-        </p:nvSpPr>
-        <p:spPr/>
-        <p:txBody>
-          <a:bodyPr/>
-          <a:lstStyle/>
-          <a:p>
-            <a:fld id="{3A98EE3D-8CD1-4C3F-BD1C-C98C9596463C}" type="slidenum">
-              <a:rPr lang="en-US" smtClean="0"/>
-              <a:t>15</a:t>
-            </a:fld>
-            <a:endParaRPr lang="en-US" dirty="0"/>
-          </a:p>
-        </p:txBody>
-      </p:sp>
-      <p:pic>
-        <p:nvPicPr>
-          <p:cNvPr id="6" name="Picture 5">
-            <a:extLst>
-              <a:ext uri="{FF2B5EF4-FFF2-40B4-BE49-F238E27FC236}">
-                <a16:creationId xmlns:a16="http://schemas.microsoft.com/office/drawing/2014/main" id="{6C7E7084-1B00-481E-96ED-6D7A8CB673FD}"/>
-              </a:ext>
-            </a:extLst>
-          </p:cNvPr>
-          <p:cNvPicPr>
-            <a:picLocks noChangeAspect="1"/>
-          </p:cNvPicPr>
-          <p:nvPr/>
-        </p:nvPicPr>
-        <p:blipFill>
-          <a:blip r:embed="rId2"/>
-          <a:stretch>
-            <a:fillRect/>
-          </a:stretch>
-        </p:blipFill>
-        <p:spPr>
-          <a:xfrm>
-            <a:off x="7586660" y="243839"/>
-            <a:ext cx="4326306" cy="1682136"/>
-          </a:xfrm>
-          <a:prstGeom prst="rect">
-            <a:avLst/>
-          </a:prstGeom>
-        </p:spPr>
-      </p:pic>
-    </p:spTree>
-    <p:extLst>
-      <p:ext uri="{BB962C8B-B14F-4D97-AF65-F5344CB8AC3E}">
-        <p14:creationId xmlns:p14="http://schemas.microsoft.com/office/powerpoint/2010/main" val="1922668766"/>
-      </p:ext>
-    </p:extLst>
-  </p:cSld>
-  <p:clrMapOvr>
-    <a:masterClrMapping/>
-  </p:clrMapOvr>
-</p:sld>
-</file>
-
-<file path=ppt/slides/slide16.xml><?xml version="1.0" encoding="utf-8"?>
-<p:sld xmlns:a="http://schemas.openxmlformats.org/drawingml/2006/main" xmlns:r="http://schemas.openxmlformats.org/officeDocument/2006/relationships" xmlns:p="http://schemas.openxmlformats.org/presentationml/2006/main">
-  <p:cSld>
-    <p:spTree>
-      <p:nvGrpSpPr>
-        <p:cNvPr id="1" name=""/>
-        <p:cNvGrpSpPr/>
-        <p:nvPr/>
-      </p:nvGrpSpPr>
-      <p:grpSpPr>
-        <a:xfrm>
-          <a:off x="0" y="0"/>
-          <a:ext cx="0" cy="0"/>
-          <a:chOff x="0" y="0"/>
-          <a:chExt cx="0" cy="0"/>
-        </a:xfrm>
-      </p:grpSpPr>
-      <p:sp>
-        <p:nvSpPr>
-          <p:cNvPr id="2" name="Title 1">
-            <a:extLst>
-              <a:ext uri="{FF2B5EF4-FFF2-40B4-BE49-F238E27FC236}">
                 <a16:creationId xmlns:a16="http://schemas.microsoft.com/office/drawing/2014/main" id="{6B1A0672-14A7-4501-900C-A98EBCCF7AFE}"/>
               </a:ext>
             </a:extLst>
@@ -9190,44 +8107,6 @@
               <a:t>Exercise all we speak</a:t>
             </a:r>
           </a:p>
-          <a:p>
-            <a:r>
-              <a:rPr lang="en-US" dirty="0"/>
-              <a:t>Optional:</a:t>
-            </a:r>
-          </a:p>
-          <a:p>
-            <a:pPr lvl="1"/>
-            <a:r>
-              <a:rPr lang="en-US" dirty="0"/>
-              <a:t>Create a helper module for logging, It has an option for the first letter of each log, and then has a service that simply generate logs like these:</a:t>
-            </a:r>
-          </a:p>
-          <a:p>
-            <a:pPr lvl="2"/>
-            <a:r>
-              <a:rPr lang="en-US" dirty="0"/>
-              <a:t>&lt;firs-letter&gt; &lt;passed-argument&gt;</a:t>
-            </a:r>
-          </a:p>
-          <a:p>
-            <a:pPr lvl="2"/>
-            <a:r>
-              <a:rPr lang="en-US" dirty="0"/>
-              <a:t>&gt; some logging</a:t>
-            </a:r>
-          </a:p>
-          <a:p>
-            <a:pPr lvl="1"/>
-            <a:r>
-              <a:rPr lang="en-US" dirty="0"/>
-              <a:t>We can inject this logger service in our services and do logging stuffs.</a:t>
-            </a:r>
-          </a:p>
-          <a:p>
-            <a:pPr lvl="1"/>
-            <a:endParaRPr lang="en-US" dirty="0"/>
-          </a:p>
         </p:txBody>
       </p:sp>
       <p:sp>
@@ -9282,7 +8161,7 @@
           <a:p>
             <a:fld id="{3A98EE3D-8CD1-4C3F-BD1C-C98C9596463C}" type="slidenum">
               <a:rPr lang="en-US" smtClean="0"/>
-              <a:t>16</a:t>
+              <a:t>11</a:t>
             </a:fld>
             <a:endParaRPr lang="en-US" dirty="0"/>
           </a:p>
@@ -9365,7 +8244,7 @@
         <p:spPr/>
         <p:txBody>
           <a:bodyPr>
-            <a:normAutofit fontScale="77500" lnSpcReduction="20000"/>
+            <a:normAutofit fontScale="92500" lnSpcReduction="10000"/>
           </a:bodyPr>
           <a:lstStyle/>
           <a:p>
@@ -9484,41 +8363,21 @@
                   <a:schemeClr val="tx1"/>
                 </a:solidFill>
               </a:rPr>
-              <a:t>Leverage Async Providers</a:t>
-            </a:r>
-          </a:p>
-          <a:p>
-            <a:pPr lvl="1"/>
-            <a:r>
-              <a:rPr lang="en-US" dirty="0">
+              <a:t>Leverage </a:t>
+            </a:r>
+            <a:r>
+              <a:rPr lang="en-US">
                 <a:solidFill>
                   <a:schemeClr val="tx1"/>
                 </a:solidFill>
               </a:rPr>
-              <a:t>Create a Dynamic Module</a:t>
-            </a:r>
-          </a:p>
-          <a:p>
-            <a:pPr lvl="1"/>
-            <a:r>
-              <a:rPr lang="en-US" dirty="0">
-                <a:solidFill>
-                  <a:schemeClr val="tx1"/>
-                </a:solidFill>
-              </a:rPr>
-              <a:t>Control Providers Scope</a:t>
-            </a:r>
-          </a:p>
-          <a:p>
-            <a:pPr lvl="1"/>
-            <a:r>
-              <a:rPr lang="en-US" dirty="0">
-                <a:solidFill>
-                  <a:schemeClr val="tx1"/>
-                </a:solidFill>
-              </a:rPr>
-              <a:t>Diving Deeper Into Request-Scoped providers</a:t>
-            </a:r>
+              <a:t>Async Providers</a:t>
+            </a:r>
+            <a:endParaRPr lang="en-US" dirty="0">
+              <a:solidFill>
+                <a:schemeClr val="tx1"/>
+              </a:solidFill>
+            </a:endParaRPr>
           </a:p>
         </p:txBody>
       </p:sp>

</xml_diff>